<commit_message>
add icon to repository and presentation
</commit_message>
<xml_diff>
--- a/presentations/2011-12-07_Projektvorstellung.pptx
+++ b/presentations/2011-12-07_Projektvorstellung.pptx
@@ -5432,76 +5432,36 @@
           </a:p>
         </p:txBody>
       </p:sp>
-      <p:sp>
-        <p:nvSpPr>
-          <p:cNvPr id="6" name="TextBox 5"/>
-          <p:cNvSpPr txBox="1"/>
+      <p:pic>
+        <p:nvPicPr>
+          <p:cNvPr id="5" name="Picture 4" descr="Icon.png"/>
+          <p:cNvPicPr>
+            <a:picLocks noChangeAspect="1"/>
+          </p:cNvPicPr>
           <p:nvPr/>
-        </p:nvSpPr>
+        </p:nvPicPr>
+        <p:blipFill>
+          <a:blip r:embed="rId2">
+            <a:extLst>
+              <a:ext uri="{28A0092B-C50C-407E-A947-70E740481C1C}">
+                <a14:useLocalDpi xmlns:a14="http://schemas.microsoft.com/office/drawing/2010/main" val="0"/>
+              </a:ext>
+            </a:extLst>
+          </a:blip>
+          <a:stretch>
+            <a:fillRect/>
+          </a:stretch>
+        </p:blipFill>
         <p:spPr>
           <a:xfrm>
-            <a:off x="113323" y="4022032"/>
-            <a:ext cx="1800831" cy="369332"/>
+            <a:off x="221224" y="3371773"/>
+            <a:ext cx="1828595" cy="1838926"/>
           </a:xfrm>
           <a:prstGeom prst="rect">
             <a:avLst/>
           </a:prstGeom>
-          <a:noFill/>
         </p:spPr>
-        <p:txBody>
-          <a:bodyPr wrap="none" rtlCol="0">
-            <a:spAutoFit/>
-          </a:bodyPr>
-          <a:lstStyle/>
-          <a:p>
-            <a:r>
-              <a:rPr lang="en-US" dirty="0" smtClean="0">
-                <a:solidFill>
-                  <a:schemeClr val="tx1"/>
-                </a:solidFill>
-              </a:rPr>
-              <a:t>[</a:t>
-            </a:r>
-            <a:r>
-              <a:rPr lang="en-US" dirty="0" err="1" smtClean="0">
-                <a:solidFill>
-                  <a:schemeClr val="tx1"/>
-                </a:solidFill>
-              </a:rPr>
-              <a:t>Bild</a:t>
-            </a:r>
-            <a:r>
-              <a:rPr lang="en-US" dirty="0" smtClean="0">
-                <a:solidFill>
-                  <a:schemeClr val="tx1"/>
-                </a:solidFill>
-              </a:rPr>
-              <a:t> / Icon </a:t>
-            </a:r>
-            <a:r>
-              <a:rPr lang="en-US" dirty="0" smtClean="0">
-                <a:solidFill>
-                  <a:schemeClr val="tx1"/>
-                </a:solidFill>
-              </a:rPr>
-              <a:t>?</a:t>
-            </a:r>
-            <a:r>
-              <a:rPr lang="en-US" dirty="0" smtClean="0">
-                <a:solidFill>
-                  <a:schemeClr val="tx1"/>
-                </a:solidFill>
-              </a:rPr>
-              <a:t>]</a:t>
-            </a:r>
-            <a:endParaRPr lang="en-US" dirty="0" smtClean="0">
-              <a:solidFill>
-                <a:schemeClr val="tx1"/>
-              </a:solidFill>
-            </a:endParaRPr>
-          </a:p>
-        </p:txBody>
-      </p:sp>
+      </p:pic>
     </p:spTree>
     <p:extLst>
       <p:ext uri="{BB962C8B-B14F-4D97-AF65-F5344CB8AC3E}">
@@ -5787,15 +5747,7 @@
             </a:pPr>
             <a:r>
               <a:rPr lang="en-US" noProof="1" smtClean="0"/>
-              <a:t>Alice m</a:t>
-            </a:r>
-            <a:r>
-              <a:rPr lang="en-US" noProof="1" smtClean="0"/>
-              <a:t>ö</a:t>
-            </a:r>
-            <a:r>
-              <a:rPr lang="en-US" noProof="1" smtClean="0"/>
-              <a:t>chte gerne einen Berliner Weihnachtsmarkt besuchen</a:t>
+              <a:t>Alice möchte gerne einen Berliner Weihnachtsmarkt besuchen</a:t>
             </a:r>
           </a:p>
           <a:p>
@@ -5845,11 +5797,7 @@
             </a:pPr>
             <a:r>
               <a:rPr lang="en-US" noProof="1" smtClean="0"/>
-              <a:t>Den f</a:t>
-            </a:r>
-            <a:r>
-              <a:rPr lang="en-US" noProof="1" smtClean="0"/>
-              <a:t>ür alle Teilnehmer günstig erreichbaren Weihnachtsmarkt ermitteln</a:t>
+              <a:t>Den für alle Teilnehmer günstig erreichbaren Weihnachtsmarkt ermitteln</a:t>
             </a:r>
           </a:p>
           <a:p>
@@ -5996,11 +5944,7 @@
             </a:pPr>
             <a:r>
               <a:rPr lang="en-US" noProof="1" smtClean="0"/>
-              <a:t>Heterogene Umgebung: 3 </a:t>
-            </a:r>
-            <a:r>
-              <a:rPr lang="en-US" noProof="1" smtClean="0"/>
-              <a:t>verschiedene mobile Betriebssysteme</a:t>
+              <a:t>Heterogene Umgebung: 3 verschiedene mobile Betriebssysteme</a:t>
             </a:r>
           </a:p>
           <a:p>
@@ -6032,7 +5976,6 @@
               <a:rPr lang="en-US" noProof="1" smtClean="0"/>
               <a:t>Datenvolumen</a:t>
             </a:r>
-            <a:endParaRPr lang="en-US" noProof="1" smtClean="0"/>
           </a:p>
           <a:p>
             <a:endParaRPr lang="en-US" noProof="1" smtClean="0"/>
@@ -6133,15 +6076,7 @@
           <a:p>
             <a:r>
               <a:rPr lang="en-US" noProof="1" smtClean="0"/>
-              <a:t>Die </a:t>
-            </a:r>
-            <a:r>
-              <a:rPr lang="en-US" noProof="1" smtClean="0"/>
-              <a:t>L</a:t>
-            </a:r>
-            <a:r>
-              <a:rPr lang="en-US" noProof="1" smtClean="0"/>
-              <a:t>ösung</a:t>
+              <a:t>Die Lösung</a:t>
             </a:r>
             <a:endParaRPr lang="en-US" noProof="1"/>
           </a:p>
@@ -6223,7 +6158,6 @@
               <a:rPr lang="en-US" noProof="1" smtClean="0"/>
               <a:t>]</a:t>
             </a:r>
-            <a:endParaRPr lang="en-US" noProof="1" smtClean="0"/>
           </a:p>
         </p:txBody>
       </p:sp>
@@ -6358,13 +6292,8 @@
             </a:pPr>
             <a:r>
               <a:rPr lang="en-US" noProof="1" smtClean="0"/>
-              <a:t>JSON-Kommunikations-Protokoll </a:t>
-            </a:r>
-            <a:r>
-              <a:rPr lang="en-US" noProof="1" smtClean="0"/>
-              <a:t>über HTTP</a:t>
-            </a:r>
-            <a:endParaRPr lang="en-US" noProof="1" smtClean="0"/>
+              <a:t>JSON-Kommunikations-Protokoll über HTTP</a:t>
+            </a:r>
           </a:p>
           <a:p>
             <a:pPr marL="285750" indent="-285750">
@@ -6375,7 +6304,6 @@
               <a:rPr lang="en-US" noProof="1" smtClean="0"/>
               <a:t>[Server-Technologie (OS, Framework, …)]</a:t>
             </a:r>
-            <a:endParaRPr lang="en-US" noProof="1" smtClean="0"/>
           </a:p>
         </p:txBody>
       </p:sp>
@@ -6500,13 +6428,8 @@
             </a:pPr>
             <a:r>
               <a:rPr lang="en-US" noProof="1" smtClean="0"/>
-              <a:t>Alternative Ans</a:t>
-            </a:r>
-            <a:r>
-              <a:rPr lang="en-US" noProof="1" smtClean="0"/>
-              <a:t>ätze für Binärprotokolle:</a:t>
-            </a:r>
-            <a:endParaRPr lang="en-US" noProof="1" smtClean="0"/>
+              <a:t>Alternative Ansätze für Binärprotokolle:</a:t>
+            </a:r>
           </a:p>
           <a:p>
             <a:pPr marL="731838" lvl="1" indent="-285750">
@@ -6515,13 +6438,8 @@
             </a:pPr>
             <a:r>
               <a:rPr lang="en-US" noProof="1" smtClean="0"/>
-              <a:t>CORBA: kompiliziert, Overkill, mangelhafte Implementierungen f</a:t>
-            </a:r>
-            <a:r>
-              <a:rPr lang="en-US" noProof="1" smtClean="0"/>
-              <a:t>ür Embdedded</a:t>
-            </a:r>
-            <a:endParaRPr lang="en-US" noProof="1" smtClean="0"/>
+              <a:t>CORBA: kompiliziert, Overkill, mangelhafte Implementierungen für Embdedded</a:t>
+            </a:r>
           </a:p>
           <a:p>
             <a:pPr marL="731838" lvl="1" indent="-285750">
@@ -6530,13 +6448,8 @@
             </a:pPr>
             <a:r>
               <a:rPr lang="en-US" noProof="1" smtClean="0"/>
-              <a:t>Thrift: schlecht dokumentiert, quasi propriet</a:t>
-            </a:r>
-            <a:r>
-              <a:rPr lang="en-US" noProof="1" smtClean="0"/>
-              <a:t>är</a:t>
-            </a:r>
-            <a:endParaRPr lang="en-US" noProof="1" smtClean="0"/>
+              <a:t>Thrift: schlecht dokumentiert, quasi proprietär</a:t>
+            </a:r>
           </a:p>
           <a:p>
             <a:pPr marL="731838" lvl="1" indent="-285750">
@@ -6545,13 +6458,8 @@
             </a:pPr>
             <a:r>
               <a:rPr lang="en-US" noProof="1" smtClean="0"/>
-              <a:t>Hessian: schlecht dokumentiert, unvollst</a:t>
-            </a:r>
-            <a:r>
-              <a:rPr lang="en-US" noProof="1" smtClean="0"/>
-              <a:t>ändige Implementierungen</a:t>
-            </a:r>
-            <a:endParaRPr lang="en-US" noProof="1" smtClean="0"/>
+              <a:t>Hessian: schlecht dokumentiert, unvollständige Implementierungen</a:t>
+            </a:r>
           </a:p>
           <a:p>
             <a:pPr marL="285750" indent="-285750">
@@ -6567,13 +6475,8 @@
             </a:pPr>
             <a:r>
               <a:rPr lang="en-US" noProof="1" smtClean="0"/>
-              <a:t>Wie viel Overhead bringt JSON tats</a:t>
-            </a:r>
-            <a:r>
-              <a:rPr lang="en-US" noProof="1" smtClean="0"/>
-              <a:t>ächlich mit? -&gt; Tim</a:t>
-            </a:r>
-            <a:endParaRPr lang="en-US" noProof="1" smtClean="0"/>
+              <a:t>Wie viel Overhead bringt JSON tatsächlich mit? -&gt; Tim</a:t>
+            </a:r>
           </a:p>
         </p:txBody>
       </p:sp>
@@ -6714,7 +6617,6 @@
               <a:rPr lang="en-US" noProof="1" smtClean="0"/>
               <a:t>]</a:t>
             </a:r>
-            <a:endParaRPr lang="en-US" noProof="1" smtClean="0"/>
           </a:p>
         </p:txBody>
       </p:sp>

</xml_diff>

<commit_message>
add protocol stuff, some reformatting
</commit_message>
<xml_diff>
--- a/presentations/2011-12-07_Projektvorstellung.pptx
+++ b/presentations/2011-12-07_Projektvorstellung.pptx
@@ -6,10 +6,10 @@
     <p:sldMasterId id="2147483653" r:id="rId2"/>
   </p:sldMasterIdLst>
   <p:notesMasterIdLst>
-    <p:notesMasterId r:id="rId11"/>
+    <p:notesMasterId r:id="rId12"/>
   </p:notesMasterIdLst>
   <p:handoutMasterIdLst>
-    <p:handoutMasterId r:id="rId12"/>
+    <p:handoutMasterId r:id="rId13"/>
   </p:handoutMasterIdLst>
   <p:sldIdLst>
     <p:sldId id="256" r:id="rId3"/>
@@ -19,7 +19,8 @@
     <p:sldId id="261" r:id="rId7"/>
     <p:sldId id="262" r:id="rId8"/>
     <p:sldId id="263" r:id="rId9"/>
-    <p:sldId id="264" r:id="rId10"/>
+    <p:sldId id="265" r:id="rId10"/>
+    <p:sldId id="264" r:id="rId11"/>
   </p:sldIdLst>
   <p:sldSz cx="9144000" cy="6858000" type="screen4x3"/>
   <p:notesSz cx="7772400" cy="10515600"/>
@@ -376,7 +377,7 @@
     </p:spTree>
     <p:extLst>
       <p:ext uri="{BB962C8B-B14F-4D97-AF65-F5344CB8AC3E}">
-        <p14:creationId xmlns:p14="http://schemas.microsoft.com/office/powerpoint/2010/main" val="613277410"/>
+        <p14:creationId xmlns:p14="http://schemas.microsoft.com/office/powerpoint/2010/main" xmlns="" val="613277410"/>
       </p:ext>
     </p:extLst>
   </p:cSld>
@@ -711,7 +712,7 @@
     </p:spTree>
     <p:extLst>
       <p:ext uri="{BB962C8B-B14F-4D97-AF65-F5344CB8AC3E}">
-        <p14:creationId xmlns:p14="http://schemas.microsoft.com/office/powerpoint/2010/main" val="4271866226"/>
+        <p14:creationId xmlns:p14="http://schemas.microsoft.com/office/powerpoint/2010/main" xmlns="" val="4271866226"/>
       </p:ext>
     </p:extLst>
   </p:cSld>
@@ -935,9 +936,287 @@
     </p:spTree>
     <p:extLst>
       <p:ext uri="{BB962C8B-B14F-4D97-AF65-F5344CB8AC3E}">
-        <p14:creationId xmlns:p14="http://schemas.microsoft.com/office/powerpoint/2010/main" val="663482453"/>
+        <p14:creationId xmlns:p14="http://schemas.microsoft.com/office/powerpoint/2010/main" xmlns="" val="663482453"/>
       </p:ext>
     </p:extLst>
+  </p:cSld>
+  <p:clrMapOvr>
+    <a:masterClrMapping/>
+  </p:clrMapOvr>
+</p:notes>
+</file>
+
+<file path=ppt/notesSlides/notesSlide2.xml><?xml version="1.0" encoding="utf-8"?>
+<p:notes xmlns:a="http://schemas.openxmlformats.org/drawingml/2006/main" xmlns:r="http://schemas.openxmlformats.org/officeDocument/2006/relationships" xmlns:p="http://schemas.openxmlformats.org/presentationml/2006/main">
+  <p:cSld>
+    <p:spTree>
+      <p:nvGrpSpPr>
+        <p:cNvPr id="1" name=""/>
+        <p:cNvGrpSpPr/>
+        <p:nvPr/>
+      </p:nvGrpSpPr>
+      <p:grpSpPr>
+        <a:xfrm>
+          <a:off x="0" y="0"/>
+          <a:ext cx="0" cy="0"/>
+          <a:chOff x="0" y="0"/>
+          <a:chExt cx="0" cy="0"/>
+        </a:xfrm>
+      </p:grpSpPr>
+      <p:sp>
+        <p:nvSpPr>
+          <p:cNvPr id="2" name="Slide Image Placeholder 1"/>
+          <p:cNvSpPr>
+            <a:spLocks noGrp="1" noRot="1" noChangeAspect="1"/>
+          </p:cNvSpPr>
+          <p:nvPr>
+            <p:ph type="sldImg"/>
+          </p:nvPr>
+        </p:nvSpPr>
+        <p:spPr/>
+      </p:sp>
+      <p:sp>
+        <p:nvSpPr>
+          <p:cNvPr id="3" name="Notes Placeholder 2"/>
+          <p:cNvSpPr>
+            <a:spLocks noGrp="1"/>
+          </p:cNvSpPr>
+          <p:nvPr>
+            <p:ph type="body" idx="1"/>
+          </p:nvPr>
+        </p:nvSpPr>
+        <p:spPr/>
+        <p:txBody>
+          <a:bodyPr>
+            <a:normAutofit/>
+          </a:bodyPr>
+          <a:lstStyle/>
+          <a:p>
+            <a:pPr marL="285750" indent="-285750">
+              <a:buFont typeface="Arial"/>
+              <a:buChar char="•"/>
+            </a:pPr>
+            <a:r>
+              <a:rPr lang="en-US" noProof="1" smtClean="0"/>
+              <a:t>Ansätze für Binärprotokolle:</a:t>
+            </a:r>
+          </a:p>
+          <a:p>
+            <a:pPr marL="731838" lvl="1" indent="-285750">
+              <a:buFont typeface="Arial"/>
+              <a:buChar char="•"/>
+            </a:pPr>
+            <a:r>
+              <a:rPr lang="en-US" noProof="1" smtClean="0"/>
+              <a:t>CORBA: mangelhafte Implementierungen für Embdedded, bietet deutlich mehr als wir zu brauchen erwarten</a:t>
+            </a:r>
+          </a:p>
+          <a:p>
+            <a:pPr marL="731838" lvl="1" indent="-285750">
+              <a:buFont typeface="Arial"/>
+              <a:buChar char="•"/>
+            </a:pPr>
+            <a:r>
+              <a:rPr lang="en-US" noProof="1" smtClean="0"/>
+              <a:t>Thrift: schlecht dokumentiert, quasi proprietär (Facebook, Twitter)</a:t>
+            </a:r>
+          </a:p>
+          <a:p>
+            <a:pPr marL="731838" lvl="1" indent="-285750">
+              <a:buFont typeface="Arial"/>
+              <a:buChar char="•"/>
+            </a:pPr>
+            <a:r>
+              <a:rPr lang="en-US" noProof="1" smtClean="0"/>
+              <a:t>Hessian: schlecht dokumentiert, </a:t>
+            </a:r>
+          </a:p>
+          <a:p>
+            <a:pPr marL="285750" indent="-285750">
+              <a:buFont typeface="Arial"/>
+              <a:buChar char="•"/>
+            </a:pPr>
+            <a:endParaRPr lang="en-US" noProof="1" smtClean="0"/>
+          </a:p>
+          <a:p>
+            <a:pPr marL="285750" indent="-285750">
+              <a:buFont typeface="Arial"/>
+              <a:buChar char="•"/>
+            </a:pPr>
+            <a:r>
+              <a:rPr lang="en-US" noProof="1" smtClean="0"/>
+              <a:t>Wie viel Overhead bringt JSON tatsächlich mit? -&gt; Tim</a:t>
+            </a:r>
+          </a:p>
+          <a:p>
+            <a:endParaRPr lang="en-US" dirty="0"/>
+          </a:p>
+        </p:txBody>
+      </p:sp>
+      <p:sp>
+        <p:nvSpPr>
+          <p:cNvPr id="4" name="Slide Number Placeholder 3"/>
+          <p:cNvSpPr>
+            <a:spLocks noGrp="1"/>
+          </p:cNvSpPr>
+          <p:nvPr>
+            <p:ph type="sldNum" sz="quarter" idx="10"/>
+          </p:nvPr>
+        </p:nvSpPr>
+        <p:spPr/>
+        <p:txBody>
+          <a:bodyPr/>
+          <a:lstStyle/>
+          <a:p>
+            <a:fld id="{6A8F3DCA-10DE-494A-957E-84CDB678C40F}" type="slidenum">
+              <a:rPr lang="de-DE" smtClean="0"/>
+              <a:pPr/>
+              <a:t>7</a:t>
+            </a:fld>
+            <a:endParaRPr lang="de-DE"/>
+          </a:p>
+        </p:txBody>
+      </p:sp>
+    </p:spTree>
+  </p:cSld>
+  <p:clrMapOvr>
+    <a:masterClrMapping/>
+  </p:clrMapOvr>
+</p:notes>
+</file>
+
+<file path=ppt/notesSlides/notesSlide3.xml><?xml version="1.0" encoding="utf-8"?>
+<p:notes xmlns:a="http://schemas.openxmlformats.org/drawingml/2006/main" xmlns:r="http://schemas.openxmlformats.org/officeDocument/2006/relationships" xmlns:p="http://schemas.openxmlformats.org/presentationml/2006/main">
+  <p:cSld>
+    <p:spTree>
+      <p:nvGrpSpPr>
+        <p:cNvPr id="1" name=""/>
+        <p:cNvGrpSpPr/>
+        <p:nvPr/>
+      </p:nvGrpSpPr>
+      <p:grpSpPr>
+        <a:xfrm>
+          <a:off x="0" y="0"/>
+          <a:ext cx="0" cy="0"/>
+          <a:chOff x="0" y="0"/>
+          <a:chExt cx="0" cy="0"/>
+        </a:xfrm>
+      </p:grpSpPr>
+      <p:sp>
+        <p:nvSpPr>
+          <p:cNvPr id="2" name="Slide Image Placeholder 1"/>
+          <p:cNvSpPr>
+            <a:spLocks noGrp="1" noRot="1" noChangeAspect="1"/>
+          </p:cNvSpPr>
+          <p:nvPr>
+            <p:ph type="sldImg"/>
+          </p:nvPr>
+        </p:nvSpPr>
+        <p:spPr/>
+      </p:sp>
+      <p:sp>
+        <p:nvSpPr>
+          <p:cNvPr id="3" name="Notes Placeholder 2"/>
+          <p:cNvSpPr>
+            <a:spLocks noGrp="1"/>
+          </p:cNvSpPr>
+          <p:nvPr>
+            <p:ph type="body" idx="1"/>
+          </p:nvPr>
+        </p:nvSpPr>
+        <p:spPr/>
+        <p:txBody>
+          <a:bodyPr>
+            <a:normAutofit/>
+          </a:bodyPr>
+          <a:lstStyle/>
+          <a:p>
+            <a:pPr marL="285750" indent="-285750">
+              <a:buFont typeface="Arial"/>
+              <a:buChar char="•"/>
+            </a:pPr>
+            <a:r>
+              <a:rPr lang="en-US" noProof="1" smtClean="0"/>
+              <a:t>Ansätze für Binärprotokolle:</a:t>
+            </a:r>
+          </a:p>
+          <a:p>
+            <a:pPr marL="731838" lvl="1" indent="-285750">
+              <a:buFont typeface="Arial"/>
+              <a:buChar char="•"/>
+            </a:pPr>
+            <a:r>
+              <a:rPr lang="en-US" noProof="1" smtClean="0"/>
+              <a:t>CORBA: mangelhafte Implementierungen für Embdedded, bietet deutlich mehr als wir zu brauchen erwarten</a:t>
+            </a:r>
+          </a:p>
+          <a:p>
+            <a:pPr marL="731838" lvl="1" indent="-285750">
+              <a:buFont typeface="Arial"/>
+              <a:buChar char="•"/>
+            </a:pPr>
+            <a:r>
+              <a:rPr lang="en-US" noProof="1" smtClean="0"/>
+              <a:t>Thrift: schlecht dokumentiert, quasi proprietär (Facebook, Twitter)</a:t>
+            </a:r>
+          </a:p>
+          <a:p>
+            <a:pPr marL="731838" lvl="1" indent="-285750">
+              <a:buFont typeface="Arial"/>
+              <a:buChar char="•"/>
+            </a:pPr>
+            <a:r>
+              <a:rPr lang="en-US" noProof="1" smtClean="0"/>
+              <a:t>Hessian: schlecht dokumentiert, </a:t>
+            </a:r>
+          </a:p>
+          <a:p>
+            <a:pPr marL="285750" indent="-285750">
+              <a:buFont typeface="Arial"/>
+              <a:buChar char="•"/>
+            </a:pPr>
+            <a:endParaRPr lang="en-US" noProof="1" smtClean="0"/>
+          </a:p>
+          <a:p>
+            <a:pPr marL="285750" indent="-285750">
+              <a:buFont typeface="Arial"/>
+              <a:buChar char="•"/>
+            </a:pPr>
+            <a:r>
+              <a:rPr lang="en-US" noProof="1" smtClean="0"/>
+              <a:t>Wie viel Overhead bringt JSON tatsächlich mit? -&gt; Tim</a:t>
+            </a:r>
+          </a:p>
+          <a:p>
+            <a:endParaRPr lang="en-US"/>
+          </a:p>
+        </p:txBody>
+      </p:sp>
+      <p:sp>
+        <p:nvSpPr>
+          <p:cNvPr id="4" name="Slide Number Placeholder 3"/>
+          <p:cNvSpPr>
+            <a:spLocks noGrp="1"/>
+          </p:cNvSpPr>
+          <p:nvPr>
+            <p:ph type="sldNum" sz="quarter" idx="10"/>
+          </p:nvPr>
+        </p:nvSpPr>
+        <p:spPr/>
+        <p:txBody>
+          <a:bodyPr/>
+          <a:lstStyle/>
+          <a:p>
+            <a:fld id="{6A8F3DCA-10DE-494A-957E-84CDB678C40F}" type="slidenum">
+              <a:rPr lang="de-DE" smtClean="0"/>
+              <a:pPr/>
+              <a:t>8</a:t>
+            </a:fld>
+            <a:endParaRPr lang="de-DE"/>
+          </a:p>
+        </p:txBody>
+      </p:sp>
+    </p:spTree>
   </p:cSld>
   <p:clrMapOvr>
     <a:masterClrMapping/>
@@ -1297,7 +1576,7 @@
   <p:timing>
     <p:tnLst>
       <p:par>
-        <p:cTn xmlns:p14="http://schemas.microsoft.com/office/powerpoint/2010/main" id="1" dur="indefinite" restart="never" nodeType="tmRoot"/>
+        <p:cTn id="1" dur="indefinite" restart="never" nodeType="tmRoot"/>
       </p:par>
     </p:tnLst>
   </p:timing>
@@ -3418,7 +3697,7 @@
   <p:timing>
     <p:tnLst>
       <p:par>
-        <p:cTn xmlns:p14="http://schemas.microsoft.com/office/powerpoint/2010/main" id="1" dur="indefinite" restart="never" nodeType="tmRoot"/>
+        <p:cTn id="1" dur="indefinite" restart="never" nodeType="tmRoot"/>
       </p:par>
     </p:tnLst>
   </p:timing>
@@ -4079,7 +4358,7 @@
   <p:timing>
     <p:tnLst>
       <p:par>
-        <p:cTn xmlns:p14="http://schemas.microsoft.com/office/powerpoint/2010/main" id="1" dur="indefinite" restart="never" nodeType="tmRoot"/>
+        <p:cTn id="1" dur="indefinite" restart="never" nodeType="tmRoot"/>
       </p:par>
     </p:tnLst>
   </p:timing>
@@ -4940,7 +5219,7 @@
   <p:timing>
     <p:tnLst>
       <p:par>
-        <p:cTn xmlns:p14="http://schemas.microsoft.com/office/powerpoint/2010/main" id="1" dur="indefinite" restart="never" nodeType="tmRoot"/>
+        <p:cTn id="1" dur="indefinite" restart="never" nodeType="tmRoot"/>
       </p:par>
     </p:tnLst>
   </p:timing>
@@ -5444,7 +5723,7 @@
           <a:blip r:embed="rId2">
             <a:extLst>
               <a:ext uri="{28A0092B-C50C-407E-A947-70E740481C1C}">
-                <a14:useLocalDpi xmlns:a14="http://schemas.microsoft.com/office/drawing/2010/main" val="0"/>
+                <a14:useLocalDpi xmlns:a14="http://schemas.microsoft.com/office/drawing/2010/main" xmlns="" val="0"/>
               </a:ext>
             </a:extLst>
           </a:blip>
@@ -5465,7 +5744,7 @@
     </p:spTree>
     <p:extLst>
       <p:ext uri="{BB962C8B-B14F-4D97-AF65-F5344CB8AC3E}">
-        <p14:creationId xmlns:p14="http://schemas.microsoft.com/office/powerpoint/2010/main" val="1369177957"/>
+        <p14:creationId xmlns:p14="http://schemas.microsoft.com/office/powerpoint/2010/main" xmlns="" val="1369177957"/>
       </p:ext>
     </p:extLst>
   </p:cSld>
@@ -5475,7 +5754,7 @@
   <p:timing>
     <p:tnLst>
       <p:par>
-        <p:cTn xmlns:p14="http://schemas.microsoft.com/office/powerpoint/2010/main" id="1" dur="indefinite" restart="never" nodeType="tmRoot"/>
+        <p:cTn id="1" dur="indefinite" restart="never" nodeType="tmRoot"/>
       </p:par>
     </p:tnLst>
   </p:timing>
@@ -5659,7 +5938,7 @@
     </p:spTree>
     <p:extLst>
       <p:ext uri="{BB962C8B-B14F-4D97-AF65-F5344CB8AC3E}">
-        <p14:creationId xmlns:p14="http://schemas.microsoft.com/office/powerpoint/2010/main" val="2255331236"/>
+        <p14:creationId xmlns:p14="http://schemas.microsoft.com/office/powerpoint/2010/main" xmlns="" val="2255331236"/>
       </p:ext>
     </p:extLst>
   </p:cSld>
@@ -5669,7 +5948,7 @@
   <p:timing>
     <p:tnLst>
       <p:par>
-        <p:cTn xmlns:p14="http://schemas.microsoft.com/office/powerpoint/2010/main" id="1" dur="indefinite" restart="never" nodeType="tmRoot"/>
+        <p:cTn id="1" dur="indefinite" restart="never" nodeType="tmRoot"/>
       </p:par>
     </p:tnLst>
   </p:timing>
@@ -5863,7 +6142,7 @@
     </p:spTree>
     <p:extLst>
       <p:ext uri="{BB962C8B-B14F-4D97-AF65-F5344CB8AC3E}">
-        <p14:creationId xmlns:p14="http://schemas.microsoft.com/office/powerpoint/2010/main" val="527401345"/>
+        <p14:creationId xmlns:p14="http://schemas.microsoft.com/office/powerpoint/2010/main" xmlns="" val="527401345"/>
       </p:ext>
     </p:extLst>
   </p:cSld>
@@ -5954,8 +6233,9 @@
             </a:pPr>
             <a:r>
               <a:rPr lang="en-US" noProof="1" smtClean="0"/>
-              <a:t>Netzwerkabbruch</a:t>
-            </a:r>
+              <a:t>Umgehen mit Netzwerkabbrüchen</a:t>
+            </a:r>
+            <a:endParaRPr lang="en-US" noProof="1" smtClean="0"/>
           </a:p>
           <a:p>
             <a:pPr marL="731838" lvl="1" indent="-285750">
@@ -5964,8 +6244,9 @@
             </a:pPr>
             <a:r>
               <a:rPr lang="en-US" noProof="1" smtClean="0"/>
-              <a:t>Energieverbrauch</a:t>
-            </a:r>
+              <a:t>Niedrighalten des Energieverbrauches</a:t>
+            </a:r>
+            <a:endParaRPr lang="en-US" noProof="1" smtClean="0"/>
           </a:p>
           <a:p>
             <a:pPr marL="731838" lvl="1" indent="-285750">
@@ -5974,8 +6255,9 @@
             </a:pPr>
             <a:r>
               <a:rPr lang="en-US" noProof="1" smtClean="0"/>
-              <a:t>Datenvolumen</a:t>
-            </a:r>
+              <a:t>Datenvolumenbeschränkungen von mobilen Tarifen beachten</a:t>
+            </a:r>
+            <a:endParaRPr lang="en-US" noProof="1" smtClean="0"/>
           </a:p>
           <a:p>
             <a:endParaRPr lang="en-US" noProof="1" smtClean="0"/>
@@ -6032,7 +6314,7 @@
     </p:spTree>
     <p:extLst>
       <p:ext uri="{BB962C8B-B14F-4D97-AF65-F5344CB8AC3E}">
-        <p14:creationId xmlns:p14="http://schemas.microsoft.com/office/powerpoint/2010/main" val="2173126471"/>
+        <p14:creationId xmlns:p14="http://schemas.microsoft.com/office/powerpoint/2010/main" xmlns="" val="2173126471"/>
       </p:ext>
     </p:extLst>
   </p:cSld>
@@ -6211,7 +6493,7 @@
     </p:spTree>
     <p:extLst>
       <p:ext uri="{BB962C8B-B14F-4D97-AF65-F5344CB8AC3E}">
-        <p14:creationId xmlns:p14="http://schemas.microsoft.com/office/powerpoint/2010/main" val="3078081548"/>
+        <p14:creationId xmlns:p14="http://schemas.microsoft.com/office/powerpoint/2010/main" xmlns="" val="3078081548"/>
       </p:ext>
     </p:extLst>
   </p:cSld>
@@ -6282,7 +6564,37 @@
             </a:pPr>
             <a:r>
               <a:rPr lang="en-US" noProof="1" smtClean="0"/>
-              <a:t>[SDK’s]</a:t>
+              <a:t>3 SDKs</a:t>
+            </a:r>
+          </a:p>
+          <a:p>
+            <a:pPr marL="731838" lvl="1" indent="-285750">
+              <a:buFont typeface="Arial"/>
+              <a:buChar char="•"/>
+            </a:pPr>
+            <a:r>
+              <a:rPr lang="en-US" noProof="1" smtClean="0"/>
+              <a:t>Objective-C (+ MacRuby?)</a:t>
+            </a:r>
+          </a:p>
+          <a:p>
+            <a:pPr marL="731838" lvl="1" indent="-285750">
+              <a:buFont typeface="Arial"/>
+              <a:buChar char="•"/>
+            </a:pPr>
+            <a:r>
+              <a:rPr lang="en-US" noProof="1" smtClean="0"/>
+              <a:t>C# (+ IronRuby)</a:t>
+            </a:r>
+          </a:p>
+          <a:p>
+            <a:pPr marL="731838" lvl="1" indent="-285750">
+              <a:buFont typeface="Arial"/>
+              <a:buChar char="•"/>
+            </a:pPr>
+            <a:r>
+              <a:rPr lang="en-US" noProof="1" smtClean="0"/>
+              <a:t>Java (+ JRuby)</a:t>
             </a:r>
           </a:p>
           <a:p>
@@ -6292,7 +6604,17 @@
             </a:pPr>
             <a:r>
               <a:rPr lang="en-US" noProof="1" smtClean="0"/>
-              <a:t>JSON-Kommunikations-Protokoll über HTTP</a:t>
+              <a:t>1 Server</a:t>
+            </a:r>
+          </a:p>
+          <a:p>
+            <a:pPr marL="731838" lvl="1" indent="-285750">
+              <a:buFont typeface="Arial"/>
+              <a:buChar char="•"/>
+            </a:pPr>
+            <a:r>
+              <a:rPr lang="en-US" noProof="1" smtClean="0"/>
+              <a:t>JRuby</a:t>
             </a:r>
           </a:p>
           <a:p>
@@ -6300,10 +6622,7 @@
               <a:buFont typeface="Arial"/>
               <a:buChar char="•"/>
             </a:pPr>
-            <a:r>
-              <a:rPr lang="en-US" noProof="1" smtClean="0"/>
-              <a:t>[Server-Technologie (OS, Framework, …)]</a:t>
-            </a:r>
+            <a:endParaRPr lang="en-US" noProof="1" smtClean="0"/>
           </a:p>
         </p:txBody>
       </p:sp>
@@ -6357,7 +6676,7 @@
     </p:spTree>
     <p:extLst>
       <p:ext uri="{BB962C8B-B14F-4D97-AF65-F5344CB8AC3E}">
-        <p14:creationId xmlns:p14="http://schemas.microsoft.com/office/powerpoint/2010/main" val="480089758"/>
+        <p14:creationId xmlns:p14="http://schemas.microsoft.com/office/powerpoint/2010/main" xmlns="" val="480089758"/>
       </p:ext>
     </p:extLst>
   </p:cSld>
@@ -6401,85 +6720,489 @@
           <a:p>
             <a:r>
               <a:rPr lang="en-US" noProof="1" smtClean="0"/>
-              <a:t>Diskussion – Warum JSON?</a:t>
+              <a:t>Diskussion – </a:t>
+            </a:r>
+            <a:r>
+              <a:rPr lang="en-US" noProof="1" smtClean="0"/>
+              <a:t>Das Wire-Protocol</a:t>
             </a:r>
             <a:endParaRPr lang="en-US" noProof="1"/>
           </a:p>
         </p:txBody>
       </p:sp>
-      <p:sp>
-        <p:nvSpPr>
-          <p:cNvPr id="3" name="Content Placeholder 2"/>
-          <p:cNvSpPr>
-            <a:spLocks noGrp="1"/>
-          </p:cNvSpPr>
+      <p:graphicFrame>
+        <p:nvGraphicFramePr>
+          <p:cNvPr id="6" name="Content Placeholder 5"/>
+          <p:cNvGraphicFramePr>
+            <a:graphicFrameLocks noGrp="1"/>
+          </p:cNvGraphicFramePr>
           <p:nvPr>
             <p:ph idx="1"/>
           </p:nvPr>
-        </p:nvSpPr>
-        <p:spPr/>
-        <p:txBody>
-          <a:bodyPr/>
-          <a:lstStyle/>
-          <a:p>
-            <a:pPr marL="285750" indent="-285750">
-              <a:buFont typeface="Arial"/>
-              <a:buChar char="•"/>
-            </a:pPr>
-            <a:r>
-              <a:rPr lang="en-US" noProof="1" smtClean="0"/>
-              <a:t>Alternative Ansätze für Binärprotokolle:</a:t>
-            </a:r>
-          </a:p>
-          <a:p>
-            <a:pPr marL="731838" lvl="1" indent="-285750">
-              <a:buFont typeface="Arial"/>
-              <a:buChar char="•"/>
-            </a:pPr>
-            <a:r>
-              <a:rPr lang="en-US" noProof="1" smtClean="0"/>
-              <a:t>CORBA: kompiliziert, Overkill, mangelhafte Implementierungen für Embdedded</a:t>
-            </a:r>
-          </a:p>
-          <a:p>
-            <a:pPr marL="731838" lvl="1" indent="-285750">
-              <a:buFont typeface="Arial"/>
-              <a:buChar char="•"/>
-            </a:pPr>
-            <a:r>
-              <a:rPr lang="en-US" noProof="1" smtClean="0"/>
-              <a:t>Thrift: schlecht dokumentiert, quasi proprietär</a:t>
-            </a:r>
-          </a:p>
-          <a:p>
-            <a:pPr marL="731838" lvl="1" indent="-285750">
-              <a:buFont typeface="Arial"/>
-              <a:buChar char="•"/>
-            </a:pPr>
-            <a:r>
-              <a:rPr lang="en-US" noProof="1" smtClean="0"/>
-              <a:t>Hessian: schlecht dokumentiert, unvollständige Implementierungen</a:t>
-            </a:r>
-          </a:p>
-          <a:p>
-            <a:pPr marL="285750" indent="-285750">
-              <a:buFont typeface="Arial"/>
-              <a:buChar char="•"/>
-            </a:pPr>
-            <a:endParaRPr lang="en-US" noProof="1" smtClean="0"/>
-          </a:p>
-          <a:p>
-            <a:pPr marL="285750" indent="-285750">
-              <a:buFont typeface="Arial"/>
-              <a:buChar char="•"/>
-            </a:pPr>
-            <a:r>
-              <a:rPr lang="en-US" noProof="1" smtClean="0"/>
-              <a:t>Wie viel Overhead bringt JSON tatsächlich mit? -&gt; Tim</a:t>
-            </a:r>
-          </a:p>
-        </p:txBody>
-      </p:sp>
+        </p:nvGraphicFramePr>
+        <p:xfrm>
+          <a:off x="719138" y="1728788"/>
+          <a:ext cx="8174037" cy="4577080"/>
+        </p:xfrm>
+        <a:graphic>
+          <a:graphicData uri="http://schemas.openxmlformats.org/drawingml/2006/table">
+            <a:tbl>
+              <a:tblPr firstRow="1" bandRow="1">
+                <a:tableStyleId>{2D5ABB26-0587-4C30-8999-92F81FD0307C}</a:tableStyleId>
+              </a:tblPr>
+              <a:tblGrid>
+                <a:gridCol w="1714573"/>
+                <a:gridCol w="2954215"/>
+                <a:gridCol w="3505249"/>
+              </a:tblGrid>
+              <a:tr h="370840">
+                <a:tc>
+                  <a:txBody>
+                    <a:bodyPr/>
+                    <a:lstStyle/>
+                    <a:p>
+                      <a:endParaRPr lang="en-US" dirty="0"/>
+                    </a:p>
+                  </a:txBody>
+                  <a:tcPr/>
+                </a:tc>
+                <a:tc>
+                  <a:txBody>
+                    <a:bodyPr/>
+                    <a:lstStyle/>
+                    <a:p>
+                      <a:endParaRPr lang="en-US" dirty="0"/>
+                    </a:p>
+                  </a:txBody>
+                  <a:tcPr/>
+                </a:tc>
+                <a:tc>
+                  <a:txBody>
+                    <a:bodyPr/>
+                    <a:lstStyle/>
+                    <a:p>
+                      <a:endParaRPr lang="en-US"/>
+                    </a:p>
+                  </a:txBody>
+                  <a:tcPr/>
+                </a:tc>
+              </a:tr>
+              <a:tr h="370840">
+                <a:tc>
+                  <a:txBody>
+                    <a:bodyPr/>
+                    <a:lstStyle/>
+                    <a:p>
+                      <a:r>
+                        <a:rPr lang="en-US" b="1" dirty="0" smtClean="0"/>
+                        <a:t>CORBA</a:t>
+                      </a:r>
+                      <a:endParaRPr lang="en-US" b="1" dirty="0"/>
+                    </a:p>
+                  </a:txBody>
+                  <a:tcPr/>
+                </a:tc>
+                <a:tc>
+                  <a:txBody>
+                    <a:bodyPr/>
+                    <a:lstStyle/>
+                    <a:p>
+                      <a:r>
+                        <a:rPr lang="en-US" dirty="0" smtClean="0"/>
+                        <a:t>IDL,</a:t>
+                      </a:r>
+                      <a:r>
+                        <a:rPr lang="en-US" baseline="0" dirty="0" smtClean="0"/>
+                        <a:t> </a:t>
+                      </a:r>
+                      <a:r>
+                        <a:rPr lang="en-US" baseline="0" dirty="0" err="1" smtClean="0"/>
+                        <a:t>Codegenerierung</a:t>
+                      </a:r>
+                      <a:r>
+                        <a:rPr lang="en-US" baseline="0" dirty="0" smtClean="0"/>
+                        <a:t>, </a:t>
+                      </a:r>
+                      <a:r>
+                        <a:rPr lang="en-US" baseline="0" dirty="0" err="1" smtClean="0"/>
+                        <a:t>Binär</a:t>
+                      </a:r>
+                      <a:r>
+                        <a:rPr lang="en-US" baseline="0" dirty="0" smtClean="0"/>
+                        <a:t>, </a:t>
+                      </a:r>
+                      <a:r>
+                        <a:rPr lang="en-US" baseline="0" dirty="0" err="1" smtClean="0"/>
+                        <a:t>Viel</a:t>
+                      </a:r>
+                      <a:r>
+                        <a:rPr lang="en-US" baseline="0" dirty="0" smtClean="0"/>
+                        <a:t> </a:t>
+                      </a:r>
+                      <a:r>
+                        <a:rPr lang="en-US" baseline="0" dirty="0" err="1" smtClean="0"/>
+                        <a:t>eingesetzt</a:t>
+                      </a:r>
+                      <a:endParaRPr lang="en-US" dirty="0"/>
+                    </a:p>
+                  </a:txBody>
+                  <a:tcPr/>
+                </a:tc>
+                <a:tc>
+                  <a:txBody>
+                    <a:bodyPr/>
+                    <a:lstStyle/>
+                    <a:p>
+                      <a:r>
+                        <a:rPr lang="en-US" baseline="0" dirty="0" err="1" smtClean="0"/>
+                        <a:t>komplizierteres</a:t>
+                      </a:r>
+                      <a:r>
+                        <a:rPr lang="en-US" baseline="0" dirty="0" smtClean="0"/>
+                        <a:t> API, </a:t>
+                      </a:r>
+                      <a:r>
+                        <a:rPr lang="en-US" baseline="0" dirty="0" err="1" smtClean="0"/>
+                        <a:t>viele</a:t>
+                      </a:r>
+                      <a:r>
+                        <a:rPr lang="en-US" baseline="0" dirty="0" smtClean="0"/>
+                        <a:t> Features, </a:t>
+                      </a:r>
+                      <a:r>
+                        <a:rPr lang="en-US" baseline="0" dirty="0" err="1" smtClean="0"/>
+                        <a:t>Keine</a:t>
+                      </a:r>
+                      <a:r>
+                        <a:rPr lang="en-US" baseline="0" dirty="0" smtClean="0"/>
+                        <a:t> </a:t>
+                      </a:r>
+                      <a:r>
+                        <a:rPr lang="en-US" baseline="0" dirty="0" err="1" smtClean="0"/>
+                        <a:t>fertige</a:t>
+                      </a:r>
+                      <a:r>
+                        <a:rPr lang="en-US" baseline="0" dirty="0" smtClean="0"/>
+                        <a:t> </a:t>
+                      </a:r>
+                      <a:r>
+                        <a:rPr lang="en-US" baseline="0" dirty="0" err="1" smtClean="0"/>
+                        <a:t>Implementierung</a:t>
+                      </a:r>
+                      <a:r>
+                        <a:rPr lang="en-US" baseline="0" dirty="0" smtClean="0"/>
+                        <a:t> </a:t>
+                      </a:r>
+                      <a:r>
+                        <a:rPr lang="en-US" baseline="0" dirty="0" err="1" smtClean="0"/>
+                        <a:t>für</a:t>
+                      </a:r>
+                      <a:r>
+                        <a:rPr lang="en-US" baseline="0" dirty="0" smtClean="0"/>
+                        <a:t> Embedded</a:t>
+                      </a:r>
+                      <a:endParaRPr lang="en-US" dirty="0"/>
+                    </a:p>
+                  </a:txBody>
+                  <a:tcPr/>
+                </a:tc>
+              </a:tr>
+              <a:tr h="370840">
+                <a:tc>
+                  <a:txBody>
+                    <a:bodyPr/>
+                    <a:lstStyle/>
+                    <a:p>
+                      <a:r>
+                        <a:rPr lang="en-US" b="1" dirty="0" smtClean="0"/>
+                        <a:t>Thrift</a:t>
+                      </a:r>
+                      <a:endParaRPr lang="en-US" dirty="0"/>
+                    </a:p>
+                  </a:txBody>
+                  <a:tcPr/>
+                </a:tc>
+                <a:tc>
+                  <a:txBody>
+                    <a:bodyPr/>
+                    <a:lstStyle/>
+                    <a:p>
+                      <a:r>
+                        <a:rPr lang="en-US" dirty="0" smtClean="0"/>
+                        <a:t>IDL, </a:t>
+                      </a:r>
+                      <a:r>
+                        <a:rPr lang="en-US" dirty="0" err="1" smtClean="0"/>
+                        <a:t>Codegenerierung</a:t>
+                      </a:r>
+                      <a:r>
+                        <a:rPr lang="en-US" dirty="0" smtClean="0"/>
+                        <a:t>, Encoding </a:t>
+                      </a:r>
+                      <a:r>
+                        <a:rPr lang="en-US" dirty="0" err="1" smtClean="0"/>
+                        <a:t>Binär</a:t>
+                      </a:r>
+                      <a:r>
+                        <a:rPr lang="en-US" dirty="0" smtClean="0"/>
+                        <a:t> </a:t>
+                      </a:r>
+                      <a:r>
+                        <a:rPr lang="en-US" dirty="0" err="1" smtClean="0"/>
+                        <a:t>oder</a:t>
+                      </a:r>
+                      <a:r>
+                        <a:rPr lang="en-US" dirty="0" smtClean="0"/>
+                        <a:t> JSON</a:t>
+                      </a:r>
+                      <a:endParaRPr lang="en-US" dirty="0"/>
+                    </a:p>
+                  </a:txBody>
+                  <a:tcPr/>
+                </a:tc>
+                <a:tc>
+                  <a:txBody>
+                    <a:bodyPr/>
+                    <a:lstStyle/>
+                    <a:p>
+                      <a:r>
+                        <a:rPr lang="en-US" dirty="0" err="1" smtClean="0"/>
+                        <a:t>Keine</a:t>
+                      </a:r>
+                      <a:r>
+                        <a:rPr lang="en-US" dirty="0" smtClean="0"/>
+                        <a:t> </a:t>
+                      </a:r>
+                      <a:r>
+                        <a:rPr lang="en-US" dirty="0" err="1" smtClean="0"/>
+                        <a:t>Dokumentation</a:t>
+                      </a:r>
+                      <a:r>
+                        <a:rPr lang="en-US" dirty="0" smtClean="0"/>
+                        <a:t>, </a:t>
+                      </a:r>
+                      <a:r>
+                        <a:rPr lang="en-US" dirty="0" err="1" smtClean="0"/>
+                        <a:t>geschlossene</a:t>
+                      </a:r>
+                      <a:r>
+                        <a:rPr lang="en-US" dirty="0" smtClean="0"/>
+                        <a:t> </a:t>
+                      </a:r>
+                      <a:r>
+                        <a:rPr lang="en-US" dirty="0" err="1" smtClean="0"/>
+                        <a:t>Entwicklung</a:t>
+                      </a:r>
+                      <a:r>
+                        <a:rPr lang="en-US" dirty="0" smtClean="0"/>
+                        <a:t>, </a:t>
+                      </a:r>
+                      <a:r>
+                        <a:rPr lang="en-US" dirty="0" err="1" smtClean="0"/>
+                        <a:t>keine</a:t>
+                      </a:r>
+                      <a:r>
+                        <a:rPr lang="en-US" dirty="0" smtClean="0"/>
+                        <a:t> </a:t>
+                      </a:r>
+                      <a:r>
+                        <a:rPr lang="en-US" dirty="0" err="1" smtClean="0"/>
+                        <a:t>Verschlüsselung</a:t>
+                      </a:r>
+                      <a:endParaRPr lang="en-US" dirty="0"/>
+                    </a:p>
+                  </a:txBody>
+                  <a:tcPr/>
+                </a:tc>
+              </a:tr>
+              <a:tr h="370840">
+                <a:tc>
+                  <a:txBody>
+                    <a:bodyPr/>
+                    <a:lstStyle/>
+                    <a:p>
+                      <a:r>
+                        <a:rPr lang="en-US" b="1" dirty="0" smtClean="0"/>
+                        <a:t>Hessian</a:t>
+                      </a:r>
+                      <a:endParaRPr lang="en-US" b="1" dirty="0"/>
+                    </a:p>
+                  </a:txBody>
+                  <a:tcPr/>
+                </a:tc>
+                <a:tc>
+                  <a:txBody>
+                    <a:bodyPr/>
+                    <a:lstStyle/>
+                    <a:p>
+                      <a:r>
+                        <a:rPr lang="en-US" dirty="0" err="1" smtClean="0"/>
+                        <a:t>Binär</a:t>
+                      </a:r>
+                      <a:r>
+                        <a:rPr lang="en-US" dirty="0" smtClean="0"/>
+                        <a:t>, </a:t>
+                      </a:r>
+                      <a:r>
+                        <a:rPr lang="en-US" dirty="0" err="1" smtClean="0"/>
+                        <a:t>als</a:t>
+                      </a:r>
+                      <a:r>
+                        <a:rPr lang="en-US" dirty="0" smtClean="0"/>
+                        <a:t> HTTP Payload, hat </a:t>
+                      </a:r>
+                      <a:r>
+                        <a:rPr lang="en-US" dirty="0" err="1" smtClean="0"/>
+                        <a:t>Implementierungen</a:t>
+                      </a:r>
+                      <a:r>
+                        <a:rPr lang="en-US" dirty="0" smtClean="0"/>
+                        <a:t> </a:t>
+                      </a:r>
+                      <a:r>
+                        <a:rPr lang="en-US" dirty="0" err="1" smtClean="0"/>
+                        <a:t>für</a:t>
+                      </a:r>
+                      <a:r>
+                        <a:rPr lang="en-US" baseline="0" dirty="0" smtClean="0"/>
+                        <a:t> Android + </a:t>
+                      </a:r>
+                      <a:r>
+                        <a:rPr lang="en-US" baseline="0" dirty="0" err="1" smtClean="0"/>
+                        <a:t>iOS</a:t>
+                      </a:r>
+                      <a:r>
+                        <a:rPr lang="en-US" baseline="0" dirty="0" smtClean="0"/>
+                        <a:t>, </a:t>
+                      </a:r>
+                      <a:r>
+                        <a:rPr lang="en-US" baseline="0" dirty="0" err="1" smtClean="0"/>
+                        <a:t>viel</a:t>
+                      </a:r>
+                      <a:r>
+                        <a:rPr lang="en-US" baseline="0" dirty="0" smtClean="0"/>
+                        <a:t> </a:t>
+                      </a:r>
+                      <a:r>
+                        <a:rPr lang="en-US" baseline="0" dirty="0" err="1" smtClean="0"/>
+                        <a:t>eingesetzt</a:t>
+                      </a:r>
+                      <a:endParaRPr lang="en-US" dirty="0"/>
+                    </a:p>
+                  </a:txBody>
+                  <a:tcPr/>
+                </a:tc>
+                <a:tc>
+                  <a:txBody>
+                    <a:bodyPr/>
+                    <a:lstStyle/>
+                    <a:p>
+                      <a:r>
+                        <a:rPr lang="en-US" dirty="0" err="1" smtClean="0"/>
+                        <a:t>Schlechte</a:t>
+                      </a:r>
+                      <a:r>
+                        <a:rPr lang="en-US" dirty="0" smtClean="0"/>
+                        <a:t> </a:t>
+                      </a:r>
+                      <a:r>
+                        <a:rPr lang="en-US" dirty="0" err="1" smtClean="0"/>
+                        <a:t>Doku</a:t>
+                      </a:r>
+                      <a:r>
+                        <a:rPr lang="en-US" dirty="0" smtClean="0"/>
+                        <a:t>, </a:t>
+                      </a:r>
+                      <a:r>
+                        <a:rPr lang="en-US" dirty="0" err="1" smtClean="0"/>
+                        <a:t>keine</a:t>
+                      </a:r>
+                      <a:r>
+                        <a:rPr lang="en-US" dirty="0" smtClean="0"/>
+                        <a:t> IDL, </a:t>
+                      </a:r>
+                      <a:r>
+                        <a:rPr lang="en-US" dirty="0" err="1" smtClean="0"/>
+                        <a:t>keine</a:t>
+                      </a:r>
+                      <a:r>
+                        <a:rPr lang="en-US" dirty="0" smtClean="0"/>
+                        <a:t> </a:t>
+                      </a:r>
+                      <a:r>
+                        <a:rPr lang="en-US" dirty="0" err="1" smtClean="0"/>
+                        <a:t>Codegenerierung</a:t>
+                      </a:r>
+                      <a:endParaRPr lang="en-US" dirty="0"/>
+                    </a:p>
+                  </a:txBody>
+                  <a:tcPr/>
+                </a:tc>
+              </a:tr>
+              <a:tr h="370840">
+                <a:tc>
+                  <a:txBody>
+                    <a:bodyPr/>
+                    <a:lstStyle/>
+                    <a:p>
+                      <a:r>
+                        <a:rPr lang="en-US" b="1" dirty="0" smtClean="0"/>
+                        <a:t>JSON</a:t>
+                      </a:r>
+                      <a:endParaRPr lang="en-US" b="1" dirty="0"/>
+                    </a:p>
+                  </a:txBody>
+                  <a:tcPr/>
+                </a:tc>
+                <a:tc>
+                  <a:txBody>
+                    <a:bodyPr/>
+                    <a:lstStyle/>
+                    <a:p>
+                      <a:r>
+                        <a:rPr lang="en-US" dirty="0" err="1" smtClean="0"/>
+                        <a:t>Einfach</a:t>
+                      </a:r>
+                      <a:r>
+                        <a:rPr lang="en-US" dirty="0" smtClean="0"/>
+                        <a:t>,</a:t>
+                      </a:r>
+                      <a:r>
+                        <a:rPr lang="en-US" baseline="0" dirty="0" smtClean="0"/>
+                        <a:t> </a:t>
+                      </a:r>
+                      <a:r>
+                        <a:rPr lang="en-US" baseline="0" dirty="0" err="1" smtClean="0"/>
+                        <a:t>beliebt</a:t>
+                      </a:r>
+                      <a:endParaRPr lang="en-US" dirty="0"/>
+                    </a:p>
+                  </a:txBody>
+                  <a:tcPr/>
+                </a:tc>
+                <a:tc>
+                  <a:txBody>
+                    <a:bodyPr/>
+                    <a:lstStyle/>
+                    <a:p>
+                      <a:r>
+                        <a:rPr lang="en-US" smtClean="0"/>
+                        <a:t>Größere</a:t>
+                      </a:r>
+                      <a:r>
+                        <a:rPr lang="en-US" baseline="0" smtClean="0"/>
+                        <a:t> Datenmenge als bei anderen Protokollen, kein “Standard”-Framework</a:t>
+                      </a:r>
+                      <a:endParaRPr lang="en-US" dirty="0"/>
+                    </a:p>
+                  </a:txBody>
+                  <a:tcPr/>
+                </a:tc>
+              </a:tr>
+            </a:tbl>
+          </a:graphicData>
+        </a:graphic>
+      </p:graphicFrame>
       <p:sp>
         <p:nvSpPr>
           <p:cNvPr id="4" name="Footer Placeholder 3"/>
@@ -6527,10 +7250,136 @@
           </a:p>
         </p:txBody>
       </p:sp>
+      <p:sp>
+        <p:nvSpPr>
+          <p:cNvPr id="7" name="Cross 6"/>
+          <p:cNvSpPr/>
+          <p:nvPr/>
+        </p:nvSpPr>
+        <p:spPr bwMode="auto">
+          <a:xfrm>
+            <a:off x="3488788" y="1378631"/>
+            <a:ext cx="661181" cy="618978"/>
+          </a:xfrm>
+          <a:prstGeom prst="plus">
+            <a:avLst>
+              <a:gd name="adj" fmla="val 38637"/>
+            </a:avLst>
+          </a:prstGeom>
+          <a:solidFill>
+            <a:srgbClr val="92D050"/>
+          </a:solidFill>
+          <a:ln w="9525" cap="flat" cmpd="sng" algn="ctr">
+            <a:solidFill>
+              <a:schemeClr val="tx1"/>
+            </a:solidFill>
+            <a:prstDash val="solid"/>
+            <a:round/>
+            <a:headEnd type="none" w="med" len="med"/>
+            <a:tailEnd type="none" w="med" len="med"/>
+          </a:ln>
+          <a:effectLst/>
+        </p:spPr>
+        <p:txBody>
+          <a:bodyPr vert="horz" wrap="none" lIns="91440" tIns="45720" rIns="91440" bIns="45720" numCol="1" rtlCol="0" anchor="ctr" anchorCtr="0" compatLnSpc="1">
+            <a:prstTxWarp prst="textNoShape">
+              <a:avLst/>
+            </a:prstTxWarp>
+          </a:bodyPr>
+          <a:lstStyle/>
+          <a:p>
+            <a:pPr marL="0" marR="0" indent="0" algn="ctr" defTabSz="914400" rtl="0" eaLnBrk="1" fontAlgn="base" latinLnBrk="0" hangingPunct="1">
+              <a:lnSpc>
+                <a:spcPct val="100000"/>
+              </a:lnSpc>
+              <a:spcBef>
+                <a:spcPct val="0"/>
+              </a:spcBef>
+              <a:spcAft>
+                <a:spcPct val="0"/>
+              </a:spcAft>
+              <a:buClrTx/>
+              <a:buSzTx/>
+              <a:buFontTx/>
+              <a:buNone/>
+              <a:tabLst/>
+            </a:pPr>
+            <a:endParaRPr kumimoji="0" lang="en-US" sz="1800" b="0" i="0" u="none" strike="noStrike" cap="none" normalizeH="0" baseline="0" smtClean="0">
+              <a:ln>
+                <a:noFill/>
+              </a:ln>
+              <a:effectLst/>
+              <a:latin typeface="Verdana" pitchFamily="34" charset="0"/>
+            </a:endParaRPr>
+          </a:p>
+        </p:txBody>
+      </p:sp>
+      <p:sp>
+        <p:nvSpPr>
+          <p:cNvPr id="8" name="Lightning Bolt 7"/>
+          <p:cNvSpPr/>
+          <p:nvPr/>
+        </p:nvSpPr>
+        <p:spPr bwMode="auto">
+          <a:xfrm>
+            <a:off x="6457071" y="1420837"/>
+            <a:ext cx="618978" cy="548640"/>
+          </a:xfrm>
+          <a:prstGeom prst="lightningBolt">
+            <a:avLst/>
+          </a:prstGeom>
+          <a:solidFill>
+            <a:schemeClr val="accent1"/>
+          </a:solidFill>
+          <a:ln w="9525" cap="flat" cmpd="sng" algn="ctr">
+            <a:solidFill>
+              <a:schemeClr val="tx1"/>
+            </a:solidFill>
+            <a:prstDash val="solid"/>
+            <a:round/>
+            <a:headEnd type="none" w="med" len="med"/>
+            <a:tailEnd type="none" w="med" len="med"/>
+          </a:ln>
+          <a:effectLst/>
+        </p:spPr>
+        <p:txBody>
+          <a:bodyPr vert="horz" wrap="none" lIns="91440" tIns="45720" rIns="91440" bIns="45720" numCol="1" rtlCol="0" anchor="ctr" anchorCtr="0" compatLnSpc="1">
+            <a:prstTxWarp prst="textNoShape">
+              <a:avLst/>
+            </a:prstTxWarp>
+          </a:bodyPr>
+          <a:lstStyle/>
+          <a:p>
+            <a:pPr marL="0" marR="0" indent="0" algn="ctr" defTabSz="914400" rtl="0" eaLnBrk="1" fontAlgn="base" latinLnBrk="0" hangingPunct="1">
+              <a:lnSpc>
+                <a:spcPct val="100000"/>
+              </a:lnSpc>
+              <a:spcBef>
+                <a:spcPct val="0"/>
+              </a:spcBef>
+              <a:spcAft>
+                <a:spcPct val="0"/>
+              </a:spcAft>
+              <a:buClrTx/>
+              <a:buSzTx/>
+              <a:buFontTx/>
+              <a:buNone/>
+              <a:tabLst/>
+            </a:pPr>
+            <a:endParaRPr kumimoji="0" lang="en-US" sz="1800" b="0" i="0" u="none" strike="noStrike" cap="none" normalizeH="0" baseline="0" smtClean="0">
+              <a:ln>
+                <a:noFill/>
+              </a:ln>
+              <a:effectLst/>
+              <a:latin typeface="Verdana" pitchFamily="34" charset="0"/>
+            </a:endParaRPr>
+          </a:p>
+        </p:txBody>
+      </p:sp>
     </p:spTree>
     <p:extLst>
       <p:ext uri="{BB962C8B-B14F-4D97-AF65-F5344CB8AC3E}">
-        <p14:creationId xmlns:p14="http://schemas.microsoft.com/office/powerpoint/2010/main" val="480089758"/>
+        <p14:creationId xmlns:p14="http://schemas.microsoft.com/office/powerpoint/2010/main" xmlns="" val="480089758"/>
       </p:ext>
     </p:extLst>
   </p:cSld>
@@ -6574,52 +7423,501 @@
           <a:p>
             <a:r>
               <a:rPr lang="en-US" noProof="1" smtClean="0"/>
-              <a:t>Server API Version 1</a:t>
+              <a:t>Diskussion – </a:t>
+            </a:r>
+            <a:r>
+              <a:rPr lang="en-US" noProof="1" smtClean="0"/>
+              <a:t>Das Wire-Protocol</a:t>
             </a:r>
             <a:endParaRPr lang="en-US" noProof="1"/>
           </a:p>
         </p:txBody>
       </p:sp>
-      <p:sp>
-        <p:nvSpPr>
-          <p:cNvPr id="3" name="Content Placeholder 2"/>
-          <p:cNvSpPr>
-            <a:spLocks noGrp="1"/>
-          </p:cNvSpPr>
+      <p:graphicFrame>
+        <p:nvGraphicFramePr>
+          <p:cNvPr id="6" name="Content Placeholder 5"/>
+          <p:cNvGraphicFramePr>
+            <a:graphicFrameLocks noGrp="1"/>
+          </p:cNvGraphicFramePr>
           <p:nvPr>
             <p:ph idx="1"/>
           </p:nvPr>
-        </p:nvSpPr>
-        <p:spPr/>
-        <p:txBody>
-          <a:bodyPr/>
-          <a:lstStyle/>
-          <a:p>
-            <a:r>
-              <a:rPr lang="en-US" noProof="1" smtClean="0"/>
-              <a:t>[</a:t>
-            </a:r>
-          </a:p>
-          <a:p>
-            <a:r>
-              <a:rPr lang="en-US" noProof="1" smtClean="0"/>
-              <a:t>grobe Beschreibung der API</a:t>
-            </a:r>
-          </a:p>
-          <a:p>
-            <a:r>
-              <a:rPr lang="en-US" noProof="1" smtClean="0"/>
-              <a:t>und des Ablaufs</a:t>
-            </a:r>
-          </a:p>
-          <a:p>
-            <a:r>
-              <a:rPr lang="en-US" noProof="1" smtClean="0"/>
-              <a:t>]</a:t>
-            </a:r>
-          </a:p>
-        </p:txBody>
-      </p:sp>
+        </p:nvGraphicFramePr>
+        <p:xfrm>
+          <a:off x="719138" y="1728788"/>
+          <a:ext cx="8174037" cy="4577080"/>
+        </p:xfrm>
+        <a:graphic>
+          <a:graphicData uri="http://schemas.openxmlformats.org/drawingml/2006/table">
+            <a:tbl>
+              <a:tblPr firstRow="1" bandRow="1">
+                <a:tableStyleId>{2D5ABB26-0587-4C30-8999-92F81FD0307C}</a:tableStyleId>
+              </a:tblPr>
+              <a:tblGrid>
+                <a:gridCol w="1714573"/>
+                <a:gridCol w="2954215"/>
+                <a:gridCol w="3505249"/>
+              </a:tblGrid>
+              <a:tr h="370840">
+                <a:tc>
+                  <a:txBody>
+                    <a:bodyPr/>
+                    <a:lstStyle/>
+                    <a:p>
+                      <a:endParaRPr lang="en-US" dirty="0"/>
+                    </a:p>
+                  </a:txBody>
+                  <a:tcPr/>
+                </a:tc>
+                <a:tc>
+                  <a:txBody>
+                    <a:bodyPr/>
+                    <a:lstStyle/>
+                    <a:p>
+                      <a:endParaRPr lang="en-US"/>
+                    </a:p>
+                  </a:txBody>
+                  <a:tcPr/>
+                </a:tc>
+                <a:tc>
+                  <a:txBody>
+                    <a:bodyPr/>
+                    <a:lstStyle/>
+                    <a:p>
+                      <a:endParaRPr lang="en-US"/>
+                    </a:p>
+                  </a:txBody>
+                  <a:tcPr/>
+                </a:tc>
+              </a:tr>
+              <a:tr h="370840">
+                <a:tc>
+                  <a:txBody>
+                    <a:bodyPr/>
+                    <a:lstStyle/>
+                    <a:p>
+                      <a:r>
+                        <a:rPr lang="en-US" b="1" dirty="0" smtClean="0"/>
+                        <a:t>CORBA</a:t>
+                      </a:r>
+                      <a:endParaRPr lang="en-US" b="1" dirty="0"/>
+                    </a:p>
+                  </a:txBody>
+                  <a:tcPr/>
+                </a:tc>
+                <a:tc>
+                  <a:txBody>
+                    <a:bodyPr/>
+                    <a:lstStyle/>
+                    <a:p>
+                      <a:r>
+                        <a:rPr lang="en-US" dirty="0" smtClean="0"/>
+                        <a:t>IDL,</a:t>
+                      </a:r>
+                      <a:r>
+                        <a:rPr lang="en-US" baseline="0" dirty="0" smtClean="0"/>
+                        <a:t> </a:t>
+                      </a:r>
+                      <a:r>
+                        <a:rPr lang="en-US" baseline="0" dirty="0" err="1" smtClean="0"/>
+                        <a:t>Codegenerierung</a:t>
+                      </a:r>
+                      <a:r>
+                        <a:rPr lang="en-US" baseline="0" dirty="0" smtClean="0"/>
+                        <a:t>, </a:t>
+                      </a:r>
+                      <a:r>
+                        <a:rPr lang="en-US" baseline="0" dirty="0" err="1" smtClean="0"/>
+                        <a:t>Binär</a:t>
+                      </a:r>
+                      <a:r>
+                        <a:rPr lang="en-US" baseline="0" dirty="0" smtClean="0"/>
+                        <a:t>, </a:t>
+                      </a:r>
+                      <a:r>
+                        <a:rPr lang="en-US" baseline="0" dirty="0" err="1" smtClean="0"/>
+                        <a:t>Viel</a:t>
+                      </a:r>
+                      <a:r>
+                        <a:rPr lang="en-US" baseline="0" dirty="0" smtClean="0"/>
+                        <a:t> </a:t>
+                      </a:r>
+                      <a:r>
+                        <a:rPr lang="en-US" baseline="0" dirty="0" err="1" smtClean="0"/>
+                        <a:t>eingesetzt</a:t>
+                      </a:r>
+                      <a:endParaRPr lang="en-US" dirty="0"/>
+                    </a:p>
+                  </a:txBody>
+                  <a:tcPr/>
+                </a:tc>
+                <a:tc>
+                  <a:txBody>
+                    <a:bodyPr/>
+                    <a:lstStyle/>
+                    <a:p>
+                      <a:r>
+                        <a:rPr lang="en-US" baseline="0" dirty="0" err="1" smtClean="0"/>
+                        <a:t>komplizierteres</a:t>
+                      </a:r>
+                      <a:r>
+                        <a:rPr lang="en-US" baseline="0" dirty="0" smtClean="0"/>
+                        <a:t> API, </a:t>
+                      </a:r>
+                      <a:r>
+                        <a:rPr lang="en-US" baseline="0" dirty="0" err="1" smtClean="0"/>
+                        <a:t>viele</a:t>
+                      </a:r>
+                      <a:r>
+                        <a:rPr lang="en-US" baseline="0" dirty="0" smtClean="0"/>
+                        <a:t> Features, </a:t>
+                      </a:r>
+                      <a:r>
+                        <a:rPr lang="en-US" baseline="0" dirty="0" err="1" smtClean="0"/>
+                        <a:t>Keine</a:t>
+                      </a:r>
+                      <a:r>
+                        <a:rPr lang="en-US" baseline="0" dirty="0" smtClean="0"/>
+                        <a:t> </a:t>
+                      </a:r>
+                      <a:r>
+                        <a:rPr lang="en-US" baseline="0" dirty="0" err="1" smtClean="0"/>
+                        <a:t>fertige</a:t>
+                      </a:r>
+                      <a:r>
+                        <a:rPr lang="en-US" baseline="0" dirty="0" smtClean="0"/>
+                        <a:t> </a:t>
+                      </a:r>
+                      <a:r>
+                        <a:rPr lang="en-US" baseline="0" dirty="0" err="1" smtClean="0"/>
+                        <a:t>Implementierung</a:t>
+                      </a:r>
+                      <a:r>
+                        <a:rPr lang="en-US" baseline="0" dirty="0" smtClean="0"/>
+                        <a:t> </a:t>
+                      </a:r>
+                      <a:r>
+                        <a:rPr lang="en-US" baseline="0" dirty="0" err="1" smtClean="0"/>
+                        <a:t>für</a:t>
+                      </a:r>
+                      <a:r>
+                        <a:rPr lang="en-US" baseline="0" dirty="0" smtClean="0"/>
+                        <a:t> Embedded</a:t>
+                      </a:r>
+                      <a:endParaRPr lang="en-US" dirty="0"/>
+                    </a:p>
+                  </a:txBody>
+                  <a:tcPr/>
+                </a:tc>
+              </a:tr>
+              <a:tr h="370840">
+                <a:tc>
+                  <a:txBody>
+                    <a:bodyPr/>
+                    <a:lstStyle/>
+                    <a:p>
+                      <a:r>
+                        <a:rPr lang="en-US" b="1" dirty="0" smtClean="0"/>
+                        <a:t>Thrift</a:t>
+                      </a:r>
+                      <a:endParaRPr lang="en-US" dirty="0"/>
+                    </a:p>
+                  </a:txBody>
+                  <a:tcPr/>
+                </a:tc>
+                <a:tc>
+                  <a:txBody>
+                    <a:bodyPr/>
+                    <a:lstStyle/>
+                    <a:p>
+                      <a:r>
+                        <a:rPr lang="en-US" dirty="0" smtClean="0"/>
+                        <a:t>IDL, </a:t>
+                      </a:r>
+                      <a:r>
+                        <a:rPr lang="en-US" dirty="0" err="1" smtClean="0"/>
+                        <a:t>Codegenerierung</a:t>
+                      </a:r>
+                      <a:r>
+                        <a:rPr lang="en-US" dirty="0" smtClean="0"/>
+                        <a:t>, Encoding </a:t>
+                      </a:r>
+                      <a:r>
+                        <a:rPr lang="en-US" dirty="0" err="1" smtClean="0"/>
+                        <a:t>Binär</a:t>
+                      </a:r>
+                      <a:r>
+                        <a:rPr lang="en-US" dirty="0" smtClean="0"/>
+                        <a:t> </a:t>
+                      </a:r>
+                      <a:r>
+                        <a:rPr lang="en-US" dirty="0" err="1" smtClean="0"/>
+                        <a:t>oder</a:t>
+                      </a:r>
+                      <a:r>
+                        <a:rPr lang="en-US" dirty="0" smtClean="0"/>
+                        <a:t> JSON</a:t>
+                      </a:r>
+                      <a:endParaRPr lang="en-US" dirty="0"/>
+                    </a:p>
+                  </a:txBody>
+                  <a:tcPr/>
+                </a:tc>
+                <a:tc>
+                  <a:txBody>
+                    <a:bodyPr/>
+                    <a:lstStyle/>
+                    <a:p>
+                      <a:r>
+                        <a:rPr lang="en-US" dirty="0" err="1" smtClean="0"/>
+                        <a:t>Keine</a:t>
+                      </a:r>
+                      <a:r>
+                        <a:rPr lang="en-US" dirty="0" smtClean="0"/>
+                        <a:t> </a:t>
+                      </a:r>
+                      <a:r>
+                        <a:rPr lang="en-US" dirty="0" err="1" smtClean="0"/>
+                        <a:t>Dokumentation</a:t>
+                      </a:r>
+                      <a:r>
+                        <a:rPr lang="en-US" dirty="0" smtClean="0"/>
+                        <a:t>, </a:t>
+                      </a:r>
+                      <a:r>
+                        <a:rPr lang="en-US" dirty="0" err="1" smtClean="0"/>
+                        <a:t>geschlossene</a:t>
+                      </a:r>
+                      <a:r>
+                        <a:rPr lang="en-US" dirty="0" smtClean="0"/>
+                        <a:t> </a:t>
+                      </a:r>
+                      <a:r>
+                        <a:rPr lang="en-US" dirty="0" err="1" smtClean="0"/>
+                        <a:t>Entwicklung</a:t>
+                      </a:r>
+                      <a:r>
+                        <a:rPr lang="en-US" dirty="0" smtClean="0"/>
+                        <a:t>, </a:t>
+                      </a:r>
+                      <a:r>
+                        <a:rPr lang="en-US" dirty="0" err="1" smtClean="0"/>
+                        <a:t>keine</a:t>
+                      </a:r>
+                      <a:r>
+                        <a:rPr lang="en-US" dirty="0" smtClean="0"/>
+                        <a:t> </a:t>
+                      </a:r>
+                      <a:r>
+                        <a:rPr lang="en-US" dirty="0" err="1" smtClean="0"/>
+                        <a:t>Verschlüsselung</a:t>
+                      </a:r>
+                      <a:endParaRPr lang="en-US" dirty="0"/>
+                    </a:p>
+                  </a:txBody>
+                  <a:tcPr/>
+                </a:tc>
+              </a:tr>
+              <a:tr h="370840">
+                <a:tc>
+                  <a:txBody>
+                    <a:bodyPr/>
+                    <a:lstStyle/>
+                    <a:p>
+                      <a:r>
+                        <a:rPr lang="en-US" b="1" dirty="0" smtClean="0"/>
+                        <a:t>Hessian</a:t>
+                      </a:r>
+                      <a:endParaRPr lang="en-US" b="1" dirty="0"/>
+                    </a:p>
+                  </a:txBody>
+                  <a:tcPr>
+                    <a:solidFill>
+                      <a:srgbClr val="FFC000"/>
+                    </a:solidFill>
+                  </a:tcPr>
+                </a:tc>
+                <a:tc>
+                  <a:txBody>
+                    <a:bodyPr/>
+                    <a:lstStyle/>
+                    <a:p>
+                      <a:r>
+                        <a:rPr lang="en-US" dirty="0" err="1" smtClean="0"/>
+                        <a:t>Binär</a:t>
+                      </a:r>
+                      <a:r>
+                        <a:rPr lang="en-US" dirty="0" smtClean="0"/>
+                        <a:t>, </a:t>
+                      </a:r>
+                      <a:r>
+                        <a:rPr lang="en-US" dirty="0" err="1" smtClean="0"/>
+                        <a:t>als</a:t>
+                      </a:r>
+                      <a:r>
+                        <a:rPr lang="en-US" dirty="0" smtClean="0"/>
+                        <a:t> HTTP Payload, hat </a:t>
+                      </a:r>
+                      <a:r>
+                        <a:rPr lang="en-US" dirty="0" err="1" smtClean="0"/>
+                        <a:t>Implementierungen</a:t>
+                      </a:r>
+                      <a:r>
+                        <a:rPr lang="en-US" dirty="0" smtClean="0"/>
+                        <a:t> </a:t>
+                      </a:r>
+                      <a:r>
+                        <a:rPr lang="en-US" dirty="0" err="1" smtClean="0"/>
+                        <a:t>für</a:t>
+                      </a:r>
+                      <a:r>
+                        <a:rPr lang="en-US" baseline="0" dirty="0" smtClean="0"/>
+                        <a:t> Android + </a:t>
+                      </a:r>
+                      <a:r>
+                        <a:rPr lang="en-US" baseline="0" dirty="0" err="1" smtClean="0"/>
+                        <a:t>iOS</a:t>
+                      </a:r>
+                      <a:r>
+                        <a:rPr lang="en-US" baseline="0" dirty="0" smtClean="0"/>
+                        <a:t>, </a:t>
+                      </a:r>
+                      <a:r>
+                        <a:rPr lang="en-US" baseline="0" dirty="0" err="1" smtClean="0"/>
+                        <a:t>viel</a:t>
+                      </a:r>
+                      <a:r>
+                        <a:rPr lang="en-US" baseline="0" dirty="0" smtClean="0"/>
+                        <a:t> </a:t>
+                      </a:r>
+                      <a:r>
+                        <a:rPr lang="en-US" baseline="0" dirty="0" err="1" smtClean="0"/>
+                        <a:t>eingesetzt</a:t>
+                      </a:r>
+                      <a:endParaRPr lang="en-US" dirty="0"/>
+                    </a:p>
+                  </a:txBody>
+                  <a:tcPr>
+                    <a:solidFill>
+                      <a:srgbClr val="FFC000"/>
+                    </a:solidFill>
+                  </a:tcPr>
+                </a:tc>
+                <a:tc>
+                  <a:txBody>
+                    <a:bodyPr/>
+                    <a:lstStyle/>
+                    <a:p>
+                      <a:r>
+                        <a:rPr lang="en-US" dirty="0" err="1" smtClean="0"/>
+                        <a:t>Schlechte</a:t>
+                      </a:r>
+                      <a:r>
+                        <a:rPr lang="en-US" dirty="0" smtClean="0"/>
+                        <a:t> </a:t>
+                      </a:r>
+                      <a:r>
+                        <a:rPr lang="en-US" dirty="0" err="1" smtClean="0"/>
+                        <a:t>Doku</a:t>
+                      </a:r>
+                      <a:r>
+                        <a:rPr lang="en-US" dirty="0" smtClean="0"/>
+                        <a:t>, </a:t>
+                      </a:r>
+                      <a:r>
+                        <a:rPr lang="en-US" dirty="0" err="1" smtClean="0"/>
+                        <a:t>keine</a:t>
+                      </a:r>
+                      <a:r>
+                        <a:rPr lang="en-US" dirty="0" smtClean="0"/>
+                        <a:t> IDL, </a:t>
+                      </a:r>
+                      <a:r>
+                        <a:rPr lang="en-US" dirty="0" err="1" smtClean="0"/>
+                        <a:t>keine</a:t>
+                      </a:r>
+                      <a:r>
+                        <a:rPr lang="en-US" dirty="0" smtClean="0"/>
+                        <a:t> </a:t>
+                      </a:r>
+                      <a:r>
+                        <a:rPr lang="en-US" dirty="0" err="1" smtClean="0"/>
+                        <a:t>Codegenerierung</a:t>
+                      </a:r>
+                      <a:endParaRPr lang="en-US" dirty="0"/>
+                    </a:p>
+                  </a:txBody>
+                  <a:tcPr>
+                    <a:solidFill>
+                      <a:srgbClr val="FFC000"/>
+                    </a:solidFill>
+                  </a:tcPr>
+                </a:tc>
+              </a:tr>
+              <a:tr h="370840">
+                <a:tc>
+                  <a:txBody>
+                    <a:bodyPr/>
+                    <a:lstStyle/>
+                    <a:p>
+                      <a:r>
+                        <a:rPr lang="en-US" b="1" dirty="0" smtClean="0"/>
+                        <a:t>JSON</a:t>
+                      </a:r>
+                      <a:endParaRPr lang="en-US" b="1" dirty="0"/>
+                    </a:p>
+                  </a:txBody>
+                  <a:tcPr/>
+                </a:tc>
+                <a:tc>
+                  <a:txBody>
+                    <a:bodyPr/>
+                    <a:lstStyle/>
+                    <a:p>
+                      <a:r>
+                        <a:rPr lang="en-US" dirty="0" err="1" smtClean="0"/>
+                        <a:t>Einfach</a:t>
+                      </a:r>
+                      <a:r>
+                        <a:rPr lang="en-US" dirty="0" smtClean="0"/>
+                        <a:t>,</a:t>
+                      </a:r>
+                      <a:r>
+                        <a:rPr lang="en-US" baseline="0" dirty="0" smtClean="0"/>
+                        <a:t> </a:t>
+                      </a:r>
+                      <a:r>
+                        <a:rPr lang="en-US" baseline="0" dirty="0" err="1" smtClean="0"/>
+                        <a:t>beliebt</a:t>
+                      </a:r>
+                      <a:endParaRPr lang="en-US" dirty="0"/>
+                    </a:p>
+                  </a:txBody>
+                  <a:tcPr/>
+                </a:tc>
+                <a:tc>
+                  <a:txBody>
+                    <a:bodyPr/>
+                    <a:lstStyle/>
+                    <a:p>
+                      <a:r>
+                        <a:rPr lang="en-US" smtClean="0"/>
+                        <a:t>Größere</a:t>
+                      </a:r>
+                      <a:r>
+                        <a:rPr lang="en-US" baseline="0" smtClean="0"/>
+                        <a:t> Datenmenge als bei anderen Protokollen, kein “Standard”-Framework</a:t>
+                      </a:r>
+                      <a:endParaRPr lang="en-US" dirty="0"/>
+                    </a:p>
+                  </a:txBody>
+                  <a:tcPr/>
+                </a:tc>
+              </a:tr>
+            </a:tbl>
+          </a:graphicData>
+        </a:graphic>
+      </p:graphicFrame>
       <p:sp>
         <p:nvSpPr>
           <p:cNvPr id="4" name="Footer Placeholder 3"/>
@@ -6667,10 +7965,276 @@
           </a:p>
         </p:txBody>
       </p:sp>
+      <p:sp>
+        <p:nvSpPr>
+          <p:cNvPr id="7" name="Cross 6"/>
+          <p:cNvSpPr/>
+          <p:nvPr/>
+        </p:nvSpPr>
+        <p:spPr bwMode="auto">
+          <a:xfrm>
+            <a:off x="3488788" y="1378631"/>
+            <a:ext cx="661181" cy="618978"/>
+          </a:xfrm>
+          <a:prstGeom prst="plus">
+            <a:avLst>
+              <a:gd name="adj" fmla="val 38637"/>
+            </a:avLst>
+          </a:prstGeom>
+          <a:solidFill>
+            <a:srgbClr val="92D050"/>
+          </a:solidFill>
+          <a:ln w="9525" cap="flat" cmpd="sng" algn="ctr">
+            <a:solidFill>
+              <a:schemeClr val="tx1"/>
+            </a:solidFill>
+            <a:prstDash val="solid"/>
+            <a:round/>
+            <a:headEnd type="none" w="med" len="med"/>
+            <a:tailEnd type="none" w="med" len="med"/>
+          </a:ln>
+          <a:effectLst/>
+        </p:spPr>
+        <p:txBody>
+          <a:bodyPr vert="horz" wrap="none" lIns="91440" tIns="45720" rIns="91440" bIns="45720" numCol="1" rtlCol="0" anchor="ctr" anchorCtr="0" compatLnSpc="1">
+            <a:prstTxWarp prst="textNoShape">
+              <a:avLst/>
+            </a:prstTxWarp>
+          </a:bodyPr>
+          <a:lstStyle/>
+          <a:p>
+            <a:pPr marL="0" marR="0" indent="0" algn="ctr" defTabSz="914400" rtl="0" eaLnBrk="1" fontAlgn="base" latinLnBrk="0" hangingPunct="1">
+              <a:lnSpc>
+                <a:spcPct val="100000"/>
+              </a:lnSpc>
+              <a:spcBef>
+                <a:spcPct val="0"/>
+              </a:spcBef>
+              <a:spcAft>
+                <a:spcPct val="0"/>
+              </a:spcAft>
+              <a:buClrTx/>
+              <a:buSzTx/>
+              <a:buFontTx/>
+              <a:buNone/>
+              <a:tabLst/>
+            </a:pPr>
+            <a:endParaRPr kumimoji="0" lang="en-US" sz="1800" b="0" i="0" u="none" strike="noStrike" cap="none" normalizeH="0" baseline="0" smtClean="0">
+              <a:ln>
+                <a:noFill/>
+              </a:ln>
+              <a:effectLst/>
+              <a:latin typeface="Verdana" pitchFamily="34" charset="0"/>
+            </a:endParaRPr>
+          </a:p>
+        </p:txBody>
+      </p:sp>
+      <p:sp>
+        <p:nvSpPr>
+          <p:cNvPr id="8" name="Lightning Bolt 7"/>
+          <p:cNvSpPr/>
+          <p:nvPr/>
+        </p:nvSpPr>
+        <p:spPr bwMode="auto">
+          <a:xfrm>
+            <a:off x="6457071" y="1420837"/>
+            <a:ext cx="618978" cy="548640"/>
+          </a:xfrm>
+          <a:prstGeom prst="lightningBolt">
+            <a:avLst/>
+          </a:prstGeom>
+          <a:solidFill>
+            <a:schemeClr val="accent1"/>
+          </a:solidFill>
+          <a:ln w="9525" cap="flat" cmpd="sng" algn="ctr">
+            <a:solidFill>
+              <a:schemeClr val="tx1"/>
+            </a:solidFill>
+            <a:prstDash val="solid"/>
+            <a:round/>
+            <a:headEnd type="none" w="med" len="med"/>
+            <a:tailEnd type="none" w="med" len="med"/>
+          </a:ln>
+          <a:effectLst/>
+        </p:spPr>
+        <p:txBody>
+          <a:bodyPr vert="horz" wrap="none" lIns="91440" tIns="45720" rIns="91440" bIns="45720" numCol="1" rtlCol="0" anchor="ctr" anchorCtr="0" compatLnSpc="1">
+            <a:prstTxWarp prst="textNoShape">
+              <a:avLst/>
+            </a:prstTxWarp>
+          </a:bodyPr>
+          <a:lstStyle/>
+          <a:p>
+            <a:pPr marL="0" marR="0" indent="0" algn="ctr" defTabSz="914400" rtl="0" eaLnBrk="1" fontAlgn="base" latinLnBrk="0" hangingPunct="1">
+              <a:lnSpc>
+                <a:spcPct val="100000"/>
+              </a:lnSpc>
+              <a:spcBef>
+                <a:spcPct val="0"/>
+              </a:spcBef>
+              <a:spcAft>
+                <a:spcPct val="0"/>
+              </a:spcAft>
+              <a:buClrTx/>
+              <a:buSzTx/>
+              <a:buFontTx/>
+              <a:buNone/>
+              <a:tabLst/>
+            </a:pPr>
+            <a:endParaRPr kumimoji="0" lang="en-US" sz="1800" b="0" i="0" u="none" strike="noStrike" cap="none" normalizeH="0" baseline="0" smtClean="0">
+              <a:ln>
+                <a:noFill/>
+              </a:ln>
+              <a:effectLst/>
+              <a:latin typeface="Verdana" pitchFamily="34" charset="0"/>
+            </a:endParaRPr>
+          </a:p>
+        </p:txBody>
+      </p:sp>
     </p:spTree>
     <p:extLst>
       <p:ext uri="{BB962C8B-B14F-4D97-AF65-F5344CB8AC3E}">
-        <p14:creationId xmlns:p14="http://schemas.microsoft.com/office/powerpoint/2010/main" val="1623943854"/>
+        <p14:creationId xmlns:p14="http://schemas.microsoft.com/office/powerpoint/2010/main" xmlns="" val="480089758"/>
+      </p:ext>
+    </p:extLst>
+  </p:cSld>
+  <p:clrMapOvr>
+    <a:masterClrMapping/>
+  </p:clrMapOvr>
+</p:sld>
+</file>
+
+<file path=ppt/slides/slide9.xml><?xml version="1.0" encoding="utf-8"?>
+<p:sld xmlns:a="http://schemas.openxmlformats.org/drawingml/2006/main" xmlns:r="http://schemas.openxmlformats.org/officeDocument/2006/relationships" xmlns:p="http://schemas.openxmlformats.org/presentationml/2006/main">
+  <p:cSld>
+    <p:spTree>
+      <p:nvGrpSpPr>
+        <p:cNvPr id="1" name=""/>
+        <p:cNvGrpSpPr/>
+        <p:nvPr/>
+      </p:nvGrpSpPr>
+      <p:grpSpPr>
+        <a:xfrm>
+          <a:off x="0" y="0"/>
+          <a:ext cx="0" cy="0"/>
+          <a:chOff x="0" y="0"/>
+          <a:chExt cx="0" cy="0"/>
+        </a:xfrm>
+      </p:grpSpPr>
+      <p:sp>
+        <p:nvSpPr>
+          <p:cNvPr id="2" name="Title 1"/>
+          <p:cNvSpPr>
+            <a:spLocks noGrp="1"/>
+          </p:cNvSpPr>
+          <p:nvPr>
+            <p:ph type="title"/>
+          </p:nvPr>
+        </p:nvSpPr>
+        <p:spPr/>
+        <p:txBody>
+          <a:bodyPr/>
+          <a:lstStyle/>
+          <a:p>
+            <a:r>
+              <a:rPr lang="en-US" noProof="1" smtClean="0"/>
+              <a:t>Server API Version 1</a:t>
+            </a:r>
+            <a:endParaRPr lang="en-US" noProof="1"/>
+          </a:p>
+        </p:txBody>
+      </p:sp>
+      <p:sp>
+        <p:nvSpPr>
+          <p:cNvPr id="3" name="Content Placeholder 2"/>
+          <p:cNvSpPr>
+            <a:spLocks noGrp="1"/>
+          </p:cNvSpPr>
+          <p:nvPr>
+            <p:ph idx="1"/>
+          </p:nvPr>
+        </p:nvSpPr>
+        <p:spPr/>
+        <p:txBody>
+          <a:bodyPr/>
+          <a:lstStyle/>
+          <a:p>
+            <a:r>
+              <a:rPr lang="en-US" noProof="1" smtClean="0"/>
+              <a:t>[</a:t>
+            </a:r>
+          </a:p>
+          <a:p>
+            <a:r>
+              <a:rPr lang="en-US" noProof="1" smtClean="0"/>
+              <a:t>grobe Beschreibung der API</a:t>
+            </a:r>
+          </a:p>
+          <a:p>
+            <a:r>
+              <a:rPr lang="en-US" noProof="1" smtClean="0"/>
+              <a:t>und des Ablaufs</a:t>
+            </a:r>
+          </a:p>
+          <a:p>
+            <a:r>
+              <a:rPr lang="en-US" noProof="1" smtClean="0"/>
+              <a:t>]</a:t>
+            </a:r>
+          </a:p>
+        </p:txBody>
+      </p:sp>
+      <p:sp>
+        <p:nvSpPr>
+          <p:cNvPr id="4" name="Footer Placeholder 3"/>
+          <p:cNvSpPr>
+            <a:spLocks noGrp="1"/>
+          </p:cNvSpPr>
+          <p:nvPr>
+            <p:ph type="ftr" sz="quarter" idx="10"/>
+          </p:nvPr>
+        </p:nvSpPr>
+        <p:spPr/>
+        <p:txBody>
+          <a:bodyPr/>
+          <a:lstStyle/>
+          <a:p>
+            <a:r>
+              <a:rPr lang="de-DE" smtClean="0"/>
+              <a:t>Find All My Friends | Eingebettete Betriebssysteme | 7. Dezember 2011</a:t>
+            </a:r>
+            <a:endParaRPr lang="de-DE"/>
+          </a:p>
+        </p:txBody>
+      </p:sp>
+      <p:sp>
+        <p:nvSpPr>
+          <p:cNvPr id="5" name="Slide Number Placeholder 4"/>
+          <p:cNvSpPr>
+            <a:spLocks noGrp="1"/>
+          </p:cNvSpPr>
+          <p:nvPr>
+            <p:ph type="sldNum" sz="quarter" idx="11"/>
+          </p:nvPr>
+        </p:nvSpPr>
+        <p:spPr/>
+        <p:txBody>
+          <a:bodyPr/>
+          <a:lstStyle/>
+          <a:p>
+            <a:fld id="{0C6113F6-D982-4F1F-82B4-AFA466AB9AFB}" type="slidenum">
+              <a:rPr lang="de-DE" smtClean="0"/>
+              <a:pPr/>
+              <a:t>9</a:t>
+            </a:fld>
+            <a:endParaRPr lang="de-DE"/>
+          </a:p>
+        </p:txBody>
+      </p:sp>
+    </p:spTree>
+    <p:extLst>
+      <p:ext uri="{BB962C8B-B14F-4D97-AF65-F5344CB8AC3E}">
+        <p14:creationId xmlns:p14="http://schemas.microsoft.com/office/powerpoint/2010/main" xmlns="" val="1623943854"/>
       </p:ext>
     </p:extLst>
   </p:cSld>

</xml_diff>